<commit_message>
[CLUSTER-16] M2 presentation outline
</commit_message>
<xml_diff>
--- a/m1-presentation/presentation.pptx
+++ b/m1-presentation/presentation.pptx
@@ -3353,25 +3353,7 @@
             </a:pPr>
             <a:r>
               <a:rPr/>
-              <a:t>Divisão por módilos</a:t>
-            </a:r>
-          </a:p>
-          <a:p>
-            <a:pPr lvl="0" marL="0" indent="0">
-              <a:buNone/>
-            </a:pPr>
-            <a:r>
-              <a:rPr/>
-              <a:t>Membros por módulo</a:t>
-            </a:r>
-          </a:p>
-          <a:p>
-            <a:pPr lvl="0" marL="0" indent="0">
-              <a:buNone/>
-            </a:pPr>
-            <a:r>
-              <a:rPr/>
-              <a:t>Tarefas por módulo</a:t>
+              <a:t>Pela metodologia Agile será feita dinamicamente a cada sprint.</a:t>
             </a:r>
           </a:p>
         </p:txBody>
@@ -3443,7 +3425,7 @@
             </a:pPr>
             <a:r>
               <a:rPr/>
-              <a:t>Lorem ipsum dolor sit amet.</a:t>
+              <a:t>TODO</a:t>
             </a:r>
           </a:p>
         </p:txBody>
@@ -3515,7 +3497,7 @@
             </a:pPr>
             <a:r>
               <a:rPr/>
-              <a:t>Lorem ipsum dolor sit amet.</a:t>
+              <a:t>Análise da propagação de som numa sala demora demasiado tempo e consome demasiados recursos.</a:t>
             </a:r>
           </a:p>
         </p:txBody>
@@ -3587,7 +3569,25 @@
             </a:pPr>
             <a:r>
               <a:rPr/>
-              <a:t>Lorem ipsum dolor sit amet.</a:t>
+              <a:t>Paralelizar DWM para acelerar o processo.</a:t>
+            </a:r>
+          </a:p>
+          <a:p>
+            <a:pPr lvl="0" marL="0" indent="0">
+              <a:buNone/>
+            </a:pPr>
+            <a:r>
+              <a:rPr/>
+              <a:t>Idealmente atingir velocidades perto de análise em tempo real para salas não muito grandes.</a:t>
+            </a:r>
+          </a:p>
+          <a:p>
+            <a:pPr lvl="0" marL="0" indent="0">
+              <a:buNone/>
+            </a:pPr>
+            <a:r>
+              <a:rPr/>
+              <a:t>Tornar a análise sonora de uma sala mais financeiramente acessível.</a:t>
             </a:r>
           </a:p>
         </p:txBody>
@@ -3654,12 +3654,38 @@
           <a:bodyPr/>
           <a:lstStyle/>
           <a:p>
-            <a:pPr lvl="0" marL="0" indent="0">
-              <a:buNone/>
-            </a:pPr>
-            <a:r>
-              <a:rPr/>
-              <a:t>Lorem ipsum dolor sit amet.</a:t>
+            <a:pPr lvl="1"/>
+            <a:r>
+              <a:rPr/>
+              <a:t>Selecionar a placa</a:t>
+            </a:r>
+          </a:p>
+          <a:p>
+            <a:pPr lvl="2"/>
+            <a:r>
+              <a:rPr/>
+              <a:t>Ter em conta os requisitos de comunicação</a:t>
+            </a:r>
+          </a:p>
+          <a:p>
+            <a:pPr lvl="1"/>
+            <a:r>
+              <a:rPr/>
+              <a:t>Portar DWM para correr na placa</a:t>
+            </a:r>
+          </a:p>
+          <a:p>
+            <a:pPr lvl="1"/>
+            <a:r>
+              <a:rPr/>
+              <a:t>Fazer o programa que distribui os dados pelo cluster</a:t>
+            </a:r>
+          </a:p>
+          <a:p>
+            <a:pPr lvl="1"/>
+            <a:r>
+              <a:rPr/>
+              <a:t>Website</a:t>
             </a:r>
           </a:p>
         </p:txBody>
@@ -3739,7 +3765,7 @@
             </a:pPr>
             <a:r>
               <a:rPr/>
-              <a:t>Lorem ipsum dolor sit amet.</a:t>
+              <a:t>Obter um cluster capaz de tornar o processamento de som tantas vezes mais rápido quantos nós ele tem.</a:t>
             </a:r>
           </a:p>
         </p:txBody>
@@ -3819,7 +3845,7 @@
             </a:pPr>
             <a:r>
               <a:rPr/>
-              <a:t>Lorem ipsum dolor sit amet.</a:t>
+              <a:t>TODO inserir as teses e alguns clusters.</a:t>
             </a:r>
           </a:p>
         </p:txBody>
@@ -3871,52 +3897,62 @@
           </a:p>
         </p:txBody>
       </p:sp>
-      <p:sp>
-        <p:nvSpPr>
-          <p:cNvPr id="3" name="Content Placeholder 2"/>
-          <p:cNvSpPr>
-            <a:spLocks noGrp="1"/>
-          </p:cNvSpPr>
-          <p:nvPr>
-            <p:ph idx="1"/>
-          </p:nvPr>
-        </p:nvSpPr>
-        <p:spPr/>
-        <p:txBody>
-          <a:bodyPr/>
-          <a:lstStyle/>
-          <a:p>
-            <a:pPr lvl="0" marL="0" indent="0">
+      <p:pic>
+        <p:nvPicPr>
+          <p:cNvPr descr="./plano.PNG" id="0" name="Picture 1"/>
+          <p:cNvPicPr>
+            <a:picLocks noGrp="1" noChangeAspect="1"/>
+          </p:cNvPicPr>
+          <p:nvPr/>
+        </p:nvPicPr>
+        <p:blipFill>
+          <a:blip r:embed="rId2"/>
+          <a:stretch>
+            <a:fillRect/>
+          </a:stretch>
+        </p:blipFill>
+        <p:spPr bwMode="auto">
+          <a:xfrm>
+            <a:off x="457200" y="2489200"/>
+            <a:ext cx="8229600" cy="2222500"/>
+          </a:xfrm>
+          <a:prstGeom prst="rect">
+            <a:avLst/>
+          </a:prstGeom>
+          <a:noFill/>
+          <a:ln w="9525">
+            <a:noFill/>
+            <a:headEnd/>
+            <a:tailEnd/>
+          </a:ln>
+        </p:spPr>
+      </p:pic>
+      <p:sp>
+        <p:nvSpPr>
+          <p:cNvPr id="1" name="TextBox 3"/>
+          <p:cNvSpPr txBox="1"/>
+          <p:nvPr/>
+        </p:nvSpPr>
+        <p:spPr>
+          <a:xfrm>
+            <a:off x="457200" y="5613400"/>
+            <a:ext cx="8229600" cy="508000"/>
+          </a:xfrm>
+          <a:prstGeom prst="rect">
+            <a:avLst/>
+          </a:prstGeom>
+          <a:noFill/>
+        </p:spPr>
+        <p:txBody>
+          <a:bodyPr/>
+          <a:lstStyle/>
+          <a:p>
+            <a:pPr lvl="0" marL="0" indent="0" algn="ctr">
               <a:buNone/>
             </a:pPr>
             <a:r>
               <a:rPr/>
               <a:t>Calendário</a:t>
-            </a:r>
-          </a:p>
-          <a:p>
-            <a:pPr lvl="1"/>
-            <a:r>
-              <a:rPr/>
-              <a:t>Milestones, exames, students@deti</a:t>
-            </a:r>
-          </a:p>
-          <a:p>
-            <a:pPr lvl="0" marL="0" indent="0">
-              <a:buNone/>
-            </a:pPr>
-            <a:r>
-              <a:rPr/>
-              <a:t>Descrver milestones</a:t>
-            </a:r>
-          </a:p>
-          <a:p>
-            <a:pPr lvl="0" marL="0" indent="0">
-              <a:buNone/>
-            </a:pPr>
-            <a:r>
-              <a:rPr/>
-              <a:t>Entregas</a:t>
             </a:r>
           </a:p>
         </p:txBody>

</xml_diff>

<commit_message>
[CLUSTER-16] Populated all presentation topics
</commit_message>
<xml_diff>
--- a/m1-presentation/presentation.pptx
+++ b/m1-presentation/presentation.pptx
@@ -3425,7 +3425,7 @@
             </a:pPr>
             <a:r>
               <a:rPr/>
-              <a:t>TODO</a:t>
+              <a:t>Este projeto enquadra-se no projeto Meshotron, que pretende criar um ASH para análise acústica de salas paralela.</a:t>
             </a:r>
           </a:p>
         </p:txBody>
@@ -3569,7 +3569,7 @@
             </a:pPr>
             <a:r>
               <a:rPr/>
-              <a:t>Paralelizar DWM para acelerar o processo.</a:t>
+              <a:t>Implementar o Meshotron em unidades computacionais de baixo custo.</a:t>
             </a:r>
           </a:p>
           <a:p>
@@ -3765,7 +3765,16 @@
             </a:pPr>
             <a:r>
               <a:rPr/>
-              <a:t>Obter um cluster capaz de tornar o processamento de som tantas vezes mais rápido quantos nós ele tem.</a:t>
+              <a:t>Para um cluster de N nós obter um processamento N vezes mais rápido.</a:t>
+            </a:r>
+          </a:p>
+          <a:p>
+            <a:pPr lvl="0" marL="0" indent="0">
+              <a:buNone/>
+            </a:pPr>
+            <a:r>
+              <a:rPr/>
+              <a:t>Idealmente este projeto comprovará a viabilidade de se converter este cluster num ASH.</a:t>
             </a:r>
           </a:p>
         </p:txBody>
@@ -3840,12 +3849,24 @@
           <a:bodyPr/>
           <a:lstStyle/>
           <a:p>
-            <a:pPr lvl="0" marL="0" indent="0">
-              <a:buNone/>
-            </a:pPr>
-            <a:r>
-              <a:rPr/>
-              <a:t>TODO inserir as teses e alguns clusters.</a:t>
+            <a:pPr lvl="1"/>
+            <a:r>
+              <a:rPr/>
+              <a:t>Sara Barros e Guilherme Campos (2010) ‘Unidades ASH para paralelização de modelos acústicos DWM tridimensionais’. 6as Jornadas Portuguesas de Arquitecturas Reconfiguráveis (REC’2010), Aveiro, Fevereiro 2010.</a:t>
+            </a:r>
+          </a:p>
+          <a:p>
+            <a:pPr lvl="1"/>
+            <a:r>
+              <a:rPr/>
+              <a:t>Carlos Romeiro, Guilherme Campos e Arnaldo Oliveira (2011) ‘Design and Simulation of a Rectangular Meshotron Unit Prototype’. Symposium on Application Accelerators in High Performance Computing (SAAHPC’11), Knoxville, Tennessee, 19-21 Julho.</a:t>
+            </a:r>
+          </a:p>
+          <a:p>
+            <a:pPr lvl="1"/>
+            <a:r>
+              <a:rPr/>
+              <a:t>Kris Wouk (2020) ‘Eight Awesome Raspberry Pi Clusters’. IoT Tech Trends.</a:t>
             </a:r>
           </a:p>
         </p:txBody>
@@ -4035,30 +4056,31 @@
           <a:bodyPr/>
           <a:lstStyle/>
           <a:p>
-            <a:pPr lvl="0" marL="0" indent="0">
-              <a:buNone/>
-            </a:pPr>
+            <a:pPr lvl="1"/>
             <a:r>
               <a:rPr/>
               <a:t>Site</a:t>
             </a:r>
           </a:p>
           <a:p>
-            <a:pPr lvl="0" marL="0" indent="0">
-              <a:buNone/>
-            </a:pPr>
-            <a:r>
-              <a:rPr/>
-              <a:t>Ferramentas em uso (github, jira e discord)</a:t>
-            </a:r>
-          </a:p>
-          <a:p>
-            <a:pPr lvl="0" marL="0" indent="0">
-              <a:buNone/>
-            </a:pPr>
-            <a:r>
-              <a:rPr/>
-              <a:t>(Posição e lista de tarefas por membro da equipa)</a:t>
+            <a:pPr lvl="1"/>
+            <a:r>
+              <a:rPr/>
+              <a:t>Github</a:t>
+            </a:r>
+          </a:p>
+          <a:p>
+            <a:pPr lvl="1"/>
+            <a:r>
+              <a:rPr/>
+              <a:t>Jira</a:t>
+            </a:r>
+          </a:p>
+          <a:p>
+            <a:pPr lvl="1"/>
+            <a:r>
+              <a:rPr/>
+              <a:t>Discord</a:t>
             </a:r>
           </a:p>
         </p:txBody>

</xml_diff>

<commit_message>
[CLUSTER-16] More and better explainations
</commit_message>
<xml_diff>
--- a/m1-presentation/presentation.pptx
+++ b/m1-presentation/presentation.pptx
@@ -3267,6 +3267,10 @@
             </a:r>
             <a:br/>
             <a:br/>
+            <a:r>
+              <a:rPr/>
+              <a:t>João</a:t>
+            </a:r>
           </a:p>
         </p:txBody>
       </p:sp>
@@ -3425,7 +3429,7 @@
             </a:pPr>
             <a:r>
               <a:rPr/>
-              <a:t>Este projeto enquadra-se no projeto Meshotron, que pretende criar um ASH para análise acústica de salas paralela.</a:t>
+              <a:t>Este projeto enquadra-se no projeto Meshotron, que pretende criar um ASH para análise acústica paralela de salas.</a:t>
             </a:r>
           </a:p>
         </p:txBody>
@@ -3500,6 +3504,15 @@
               <a:t>Análise da propagação de som numa sala demora demasiado tempo e consome demasiados recursos.</a:t>
             </a:r>
           </a:p>
+          <a:p>
+            <a:pPr lvl="0" marL="0" indent="0">
+              <a:buNone/>
+            </a:pPr>
+            <a:r>
+              <a:rPr/>
+              <a:t>Temos provas de que este modelo resolve estes problemas, mas fazer ASHs é muito caro.</a:t>
+            </a:r>
+          </a:p>
         </p:txBody>
       </p:sp>
     </p:spTree>
@@ -3564,30 +3577,24 @@
           <a:bodyPr/>
           <a:lstStyle/>
           <a:p>
-            <a:pPr lvl="0" marL="0" indent="0">
-              <a:buNone/>
-            </a:pPr>
+            <a:pPr lvl="1"/>
+            <a:r>
+              <a:rPr/>
+              <a:t>Tornar a análise sonora de uma sala mais financeiramente acessível.</a:t>
+            </a:r>
+          </a:p>
+          <a:p>
+            <a:pPr lvl="1"/>
             <a:r>
               <a:rPr/>
               <a:t>Implementar o Meshotron em unidades computacionais de baixo custo.</a:t>
             </a:r>
           </a:p>
           <a:p>
-            <a:pPr lvl="0" marL="0" indent="0">
-              <a:buNone/>
-            </a:pPr>
+            <a:pPr lvl="1"/>
             <a:r>
               <a:rPr/>
               <a:t>Idealmente atingir velocidades perto de análise em tempo real para salas não muito grandes.</a:t>
-            </a:r>
-          </a:p>
-          <a:p>
-            <a:pPr lvl="0" marL="0" indent="0">
-              <a:buNone/>
-            </a:pPr>
-            <a:r>
-              <a:rPr/>
-              <a:t>Tornar a análise sonora de uma sala mais financeiramente acessível.</a:t>
             </a:r>
           </a:p>
         </p:txBody>
@@ -3671,7 +3678,7 @@
             <a:pPr lvl="1"/>
             <a:r>
               <a:rPr/>
-              <a:t>Portar DWM para correr na placa</a:t>
+              <a:t>Portar DWM para correr nas placas</a:t>
             </a:r>
           </a:p>
           <a:p>
@@ -4059,7 +4066,7 @@
             <a:pPr lvl="1"/>
             <a:r>
               <a:rPr/>
-              <a:t>Site</a:t>
+              <a:t>Site https://meshotron2.github.io/comunication/meshotron/</a:t>
             </a:r>
           </a:p>
           <a:p>

</xml_diff>

<commit_message>
[CLUSTER-16] Compiled the presentation and added my nmec to the site
</commit_message>
<xml_diff>
--- a/m1-presentation/presentation.pptx
+++ b/m1-presentation/presentation.pptx
@@ -15,6 +15,7 @@
     <p:sldId id="263" r:id="rId9"/>
     <p:sldId id="264" r:id="rId10"/>
     <p:sldId id="265" r:id="rId11"/>
+    <p:sldId id="266" r:id="rId12"/>
   </p:sldIdLst>
   <p:sldSz cx="9144000" cy="6858000" type="screen4x3"/>
   <p:notesSz cx="6858000" cy="9144000"/>
@@ -3269,7 +3270,72 @@
             <a:br/>
             <a:r>
               <a:rPr/>
+              <a:t>Bruno</a:t>
+            </a:r>
+            <a:r>
+              <a:rPr/>
+              <a:t> </a:t>
+            </a:r>
+            <a:r>
+              <a:rPr/>
+              <a:t>Silva</a:t>
+            </a:r>
+            <a:br/>
+            <a:r>
+              <a:rPr/>
               <a:t>João</a:t>
+            </a:r>
+            <a:r>
+              <a:rPr/>
+              <a:t> </a:t>
+            </a:r>
+            <a:r>
+              <a:rPr/>
+              <a:t>Felisberto</a:t>
+            </a:r>
+            <a:br/>
+            <a:r>
+              <a:rPr/>
+              <a:t>Jodionísio</a:t>
+            </a:r>
+            <a:r>
+              <a:rPr/>
+              <a:t> </a:t>
+            </a:r>
+            <a:r>
+              <a:rPr/>
+              <a:t>Muachifi</a:t>
+            </a:r>
+            <a:br/>
+            <a:r>
+              <a:rPr/>
+              <a:t>Marta Oliveira</a:t>
+            </a:r>
+            <a:br/>
+            <a:r>
+              <a:rPr/>
+              <a:t>Ruben</a:t>
+            </a:r>
+            <a:r>
+              <a:rPr/>
+              <a:t> </a:t>
+            </a:r>
+            <a:r>
+              <a:rPr/>
+              <a:t>Castelhano</a:t>
+            </a:r>
+            <a:br/>
+            <a:r>
+              <a:rPr/>
+              <a:t>Vasco</a:t>
+            </a:r>
+            <a:r>
+              <a:rPr/>
+              <a:t> </a:t>
+            </a:r>
+            <a:r>
+              <a:rPr/>
+              <a:t>Santos</a:t>
             </a:r>
           </a:p>
         </p:txBody>
@@ -3316,6 +3382,113 @@
             </a:pPr>
             <a:r>
               <a:rPr/>
+              <a:t>Plano</a:t>
+            </a:r>
+            <a:r>
+              <a:rPr/>
+              <a:t> </a:t>
+            </a:r>
+            <a:r>
+              <a:rPr/>
+              <a:t>de</a:t>
+            </a:r>
+            <a:r>
+              <a:rPr/>
+              <a:t> </a:t>
+            </a:r>
+            <a:r>
+              <a:rPr/>
+              <a:t>comunicação</a:t>
+            </a:r>
+          </a:p>
+        </p:txBody>
+      </p:sp>
+      <p:sp>
+        <p:nvSpPr>
+          <p:cNvPr id="3" name="Content Placeholder 2"/>
+          <p:cNvSpPr>
+            <a:spLocks noGrp="1"/>
+          </p:cNvSpPr>
+          <p:nvPr>
+            <p:ph idx="1"/>
+          </p:nvPr>
+        </p:nvSpPr>
+        <p:spPr/>
+        <p:txBody>
+          <a:bodyPr/>
+          <a:lstStyle/>
+          <a:p>
+            <a:pPr lvl="1"/>
+            <a:r>
+              <a:rPr/>
+              <a:t>Site https://meshotron2.github.io/comunication/meshotron/</a:t>
+            </a:r>
+          </a:p>
+          <a:p>
+            <a:pPr lvl="1"/>
+            <a:r>
+              <a:rPr/>
+              <a:t>Github</a:t>
+            </a:r>
+          </a:p>
+          <a:p>
+            <a:pPr lvl="1"/>
+            <a:r>
+              <a:rPr/>
+              <a:t>Jira</a:t>
+            </a:r>
+          </a:p>
+          <a:p>
+            <a:pPr lvl="1"/>
+            <a:r>
+              <a:rPr/>
+              <a:t>Discord</a:t>
+            </a:r>
+          </a:p>
+        </p:txBody>
+      </p:sp>
+    </p:spTree>
+  </p:cSld>
+</p:sld>
+</file>
+
+<file path=ppt/slides/slide11.xml><?xml version="1.0" encoding="utf-8"?>
+<p:sld xmlns:a="http://schemas.openxmlformats.org/drawingml/2006/main" xmlns:r="http://schemas.openxmlformats.org/officeDocument/2006/relationships" xmlns:p="http://schemas.openxmlformats.org/presentationml/2006/main">
+  <p:cSld>
+    <p:spTree>
+      <p:nvGrpSpPr>
+        <p:cNvPr id="1" name=""/>
+        <p:cNvGrpSpPr/>
+        <p:nvPr/>
+      </p:nvGrpSpPr>
+      <p:grpSpPr>
+        <a:xfrm>
+          <a:off x="0" y="0"/>
+          <a:ext cx="0" cy="0"/>
+          <a:chOff x="0" y="0"/>
+          <a:chExt cx="0" cy="0"/>
+        </a:xfrm>
+      </p:grpSpPr>
+      <p:sp>
+        <p:nvSpPr>
+          <p:cNvPr id="2" name="Title 1"/>
+          <p:cNvSpPr>
+            <a:spLocks noGrp="1"/>
+          </p:cNvSpPr>
+          <p:nvPr>
+            <p:ph type="title"/>
+          </p:nvPr>
+        </p:nvSpPr>
+        <p:spPr/>
+        <p:txBody>
+          <a:bodyPr/>
+          <a:lstStyle/>
+          <a:p>
+            <a:pPr lvl="0" marL="0" indent="0">
+              <a:buNone/>
+            </a:pPr>
+            <a:r>
+              <a:rPr/>
               <a:t>Distribuição</a:t>
             </a:r>
             <a:r>
@@ -3358,6 +3531,24 @@
             <a:r>
               <a:rPr/>
               <a:t>Pela metodologia Agile será feita dinamicamente a cada sprint.</a:t>
+            </a:r>
+          </a:p>
+          <a:p>
+            <a:pPr lvl="0" marL="0" indent="0">
+              <a:buNone/>
+            </a:pPr>
+            <a:r>
+              <a:rPr/>
+              <a:t>Todos os elementos do grupo irão trabalhar nas diferentes frentes de trabalho, num sistema de rotatividade.</a:t>
+            </a:r>
+          </a:p>
+          <a:p>
+            <a:pPr lvl="0" marL="0" indent="0">
+              <a:buNone/>
+            </a:pPr>
+            <a:r>
+              <a:rPr/>
+              <a:t>No final de cada sprint cada um dos elementos poderá integrar uma frente diferente.</a:t>
             </a:r>
           </a:p>
         </p:txBody>
@@ -3476,7 +3667,7 @@
             </a:pPr>
             <a:r>
               <a:rPr/>
-              <a:t>Problema</a:t>
+              <a:t>Equipa</a:t>
             </a:r>
           </a:p>
         </p:txBody>
@@ -3501,7 +3692,7 @@
             </a:pPr>
             <a:r>
               <a:rPr/>
-              <a:t>Análise da propagação de som numa sala demora demasiado tempo e consome demasiados recursos.</a:t>
+              <a:t>Deste projeto irão fazer parte os alunos do grupo 8 da unidade curricular PECI de LECI sendo eles: - Bruno Silva - João Felisberto - Jodionísio Muachifi - Marta Oliveira - Ruben Castelhano - Vasco Santos</a:t>
             </a:r>
           </a:p>
           <a:p>
@@ -3510,7 +3701,7 @@
             </a:pPr>
             <a:r>
               <a:rPr/>
-              <a:t>Temos provas de que este modelo resolve estes problemas, mas fazer ASHs é muito caro.</a:t>
+              <a:t>Contando com a orientação do professor Guilherme Campos e coorientação do professor Arnaldo Oliveira.</a:t>
             </a:r>
           </a:p>
         </p:txBody>
@@ -3557,7 +3748,7 @@
             </a:pPr>
             <a:r>
               <a:rPr/>
-              <a:t>Objetivos</a:t>
+              <a:t>Problema</a:t>
             </a:r>
           </a:p>
         </p:txBody>
@@ -3577,24 +3768,30 @@
           <a:bodyPr/>
           <a:lstStyle/>
           <a:p>
-            <a:pPr lvl="1"/>
-            <a:r>
-              <a:rPr/>
-              <a:t>Tornar a análise sonora de uma sala mais financeiramente acessível.</a:t>
-            </a:r>
-          </a:p>
-          <a:p>
-            <a:pPr lvl="1"/>
-            <a:r>
-              <a:rPr/>
-              <a:t>Implementar o Meshotron em unidades computacionais de baixo custo.</a:t>
-            </a:r>
-          </a:p>
-          <a:p>
-            <a:pPr lvl="1"/>
-            <a:r>
-              <a:rPr/>
-              <a:t>Idealmente atingir velocidades perto de análise em tempo real para salas não muito grandes.</a:t>
+            <a:pPr lvl="0" marL="0" indent="0">
+              <a:buNone/>
+            </a:pPr>
+            <a:r>
+              <a:rPr/>
+              <a:t>Análise da propagação de som numa sala demora demasiado tempo e consome demasiados recursos.</a:t>
+            </a:r>
+          </a:p>
+          <a:p>
+            <a:pPr lvl="0" marL="0" indent="0">
+              <a:buNone/>
+            </a:pPr>
+            <a:r>
+              <a:rPr/>
+              <a:t>Temos provas de que este modelo resolve estes problemas, mas fazer ASHs é muito caro.</a:t>
+            </a:r>
+          </a:p>
+          <a:p>
+            <a:pPr lvl="0" marL="0" indent="0">
+              <a:buNone/>
+            </a:pPr>
+            <a:r>
+              <a:rPr/>
+              <a:t>O problema físico que queremos solucionar é a modelação acústica.</a:t>
             </a:r>
           </a:p>
         </p:txBody>
@@ -3641,7 +3838,7 @@
             </a:pPr>
             <a:r>
               <a:rPr/>
-              <a:t>Tarefas</a:t>
+              <a:t>Objetivos</a:t>
             </a:r>
           </a:p>
         </p:txBody>
@@ -3664,35 +3861,28 @@
             <a:pPr lvl="1"/>
             <a:r>
               <a:rPr/>
-              <a:t>Selecionar a placa</a:t>
-            </a:r>
-          </a:p>
-          <a:p>
-            <a:pPr lvl="2"/>
-            <a:r>
-              <a:rPr/>
-              <a:t>Ter em conta os requisitos de comunicação</a:t>
+              <a:t>Tornar a análise sonora de uma sala mais financeiramente acessível.</a:t>
             </a:r>
           </a:p>
           <a:p>
             <a:pPr lvl="1"/>
             <a:r>
               <a:rPr/>
-              <a:t>Portar DWM para correr nas placas</a:t>
+              <a:t>Implementar o Meshotron em unidades computacionais de baixo custo.</a:t>
             </a:r>
           </a:p>
           <a:p>
             <a:pPr lvl="1"/>
             <a:r>
               <a:rPr/>
-              <a:t>Fazer o programa que distribui os dados pelo cluster</a:t>
+              <a:t>Idealmente atingir velocidades perto de análise em tempo real para salas não muito grandes.</a:t>
             </a:r>
           </a:p>
           <a:p>
             <a:pPr lvl="1"/>
             <a:r>
               <a:rPr/>
-              <a:t>Website</a:t>
+              <a:t>Ter unidades que comunicam por links independentes.</a:t>
             </a:r>
           </a:p>
         </p:txBody>
@@ -3739,15 +3929,7 @@
             </a:pPr>
             <a:r>
               <a:rPr/>
-              <a:t>Resultados</a:t>
-            </a:r>
-            <a:r>
-              <a:rPr/>
-              <a:t> </a:t>
-            </a:r>
-            <a:r>
-              <a:rPr/>
-              <a:t>esperados</a:t>
+              <a:t>Tarefas</a:t>
             </a:r>
           </a:p>
         </p:txBody>
@@ -3767,21 +3949,45 @@
           <a:bodyPr/>
           <a:lstStyle/>
           <a:p>
-            <a:pPr lvl="0" marL="0" indent="0">
-              <a:buNone/>
-            </a:pPr>
-            <a:r>
-              <a:rPr/>
-              <a:t>Para um cluster de N nós obter um processamento N vezes mais rápido.</a:t>
-            </a:r>
-          </a:p>
-          <a:p>
-            <a:pPr lvl="0" marL="0" indent="0">
-              <a:buNone/>
-            </a:pPr>
-            <a:r>
-              <a:rPr/>
-              <a:t>Idealmente este projeto comprovará a viabilidade de se converter este cluster num ASH.</a:t>
+            <a:pPr lvl="1"/>
+            <a:r>
+              <a:rPr/>
+              <a:t>Selecionar a placa</a:t>
+            </a:r>
+          </a:p>
+          <a:p>
+            <a:pPr lvl="2"/>
+            <a:r>
+              <a:rPr/>
+              <a:t>Ter em conta os requisitos de comunicação</a:t>
+            </a:r>
+          </a:p>
+          <a:p>
+            <a:pPr lvl="1"/>
+            <a:r>
+              <a:rPr/>
+              <a:t>Escolha dos switches</a:t>
+            </a:r>
+          </a:p>
+          <a:p>
+            <a:pPr lvl="1"/>
+            <a:r>
+              <a:rPr/>
+              <a:t>Portar DWM para correr nas placas</a:t>
+            </a:r>
+          </a:p>
+          <a:p>
+            <a:pPr lvl="1"/>
+            <a:r>
+              <a:rPr/>
+              <a:t>Fazer o programa que distribui os dados pelo cluster</a:t>
+            </a:r>
+          </a:p>
+          <a:p>
+            <a:pPr lvl="1"/>
+            <a:r>
+              <a:rPr/>
+              <a:t>Website</a:t>
             </a:r>
           </a:p>
         </p:txBody>
@@ -3828,7 +4034,7 @@
             </a:pPr>
             <a:r>
               <a:rPr/>
-              <a:t>Trabalho</a:t>
+              <a:t>Resultados</a:t>
             </a:r>
             <a:r>
               <a:rPr/>
@@ -3836,7 +4042,7 @@
             </a:r>
             <a:r>
               <a:rPr/>
-              <a:t>relacionado</a:t>
+              <a:t>esperados</a:t>
             </a:r>
           </a:p>
         </p:txBody>
@@ -3856,24 +4062,21 @@
           <a:bodyPr/>
           <a:lstStyle/>
           <a:p>
-            <a:pPr lvl="1"/>
-            <a:r>
-              <a:rPr/>
-              <a:t>Sara Barros e Guilherme Campos (2010) ‘Unidades ASH para paralelização de modelos acústicos DWM tridimensionais’. 6as Jornadas Portuguesas de Arquitecturas Reconfiguráveis (REC’2010), Aveiro, Fevereiro 2010.</a:t>
-            </a:r>
-          </a:p>
-          <a:p>
-            <a:pPr lvl="1"/>
-            <a:r>
-              <a:rPr/>
-              <a:t>Carlos Romeiro, Guilherme Campos e Arnaldo Oliveira (2011) ‘Design and Simulation of a Rectangular Meshotron Unit Prototype’. Symposium on Application Accelerators in High Performance Computing (SAAHPC’11), Knoxville, Tennessee, 19-21 Julho.</a:t>
-            </a:r>
-          </a:p>
-          <a:p>
-            <a:pPr lvl="1"/>
-            <a:r>
-              <a:rPr/>
-              <a:t>Kris Wouk (2020) ‘Eight Awesome Raspberry Pi Clusters’. IoT Tech Trends.</a:t>
+            <a:pPr lvl="0" marL="0" indent="0">
+              <a:buNone/>
+            </a:pPr>
+            <a:r>
+              <a:rPr/>
+              <a:t>Para um cluster de N nós obter um processamento N vezes mais rápido.</a:t>
+            </a:r>
+          </a:p>
+          <a:p>
+            <a:pPr lvl="0" marL="0" indent="0">
+              <a:buNone/>
+            </a:pPr>
+            <a:r>
+              <a:rPr/>
+              <a:t>Idealmente este projeto comprovará a viabilidade de se converter este cluster num ASH.</a:t>
             </a:r>
           </a:p>
         </p:txBody>
@@ -3884,6 +4087,98 @@
 </file>
 
 <file path=ppt/slides/slide8.xml><?xml version="1.0" encoding="utf-8"?>
+<p:sld xmlns:a="http://schemas.openxmlformats.org/drawingml/2006/main" xmlns:r="http://schemas.openxmlformats.org/officeDocument/2006/relationships" xmlns:p="http://schemas.openxmlformats.org/presentationml/2006/main">
+  <p:cSld>
+    <p:spTree>
+      <p:nvGrpSpPr>
+        <p:cNvPr id="1" name=""/>
+        <p:cNvGrpSpPr/>
+        <p:nvPr/>
+      </p:nvGrpSpPr>
+      <p:grpSpPr>
+        <a:xfrm>
+          <a:off x="0" y="0"/>
+          <a:ext cx="0" cy="0"/>
+          <a:chOff x="0" y="0"/>
+          <a:chExt cx="0" cy="0"/>
+        </a:xfrm>
+      </p:grpSpPr>
+      <p:sp>
+        <p:nvSpPr>
+          <p:cNvPr id="2" name="Title 1"/>
+          <p:cNvSpPr>
+            <a:spLocks noGrp="1"/>
+          </p:cNvSpPr>
+          <p:nvPr>
+            <p:ph type="title"/>
+          </p:nvPr>
+        </p:nvSpPr>
+        <p:spPr/>
+        <p:txBody>
+          <a:bodyPr/>
+          <a:lstStyle/>
+          <a:p>
+            <a:pPr lvl="0" marL="0" indent="0">
+              <a:buNone/>
+            </a:pPr>
+            <a:r>
+              <a:rPr/>
+              <a:t>Trabalho</a:t>
+            </a:r>
+            <a:r>
+              <a:rPr/>
+              <a:t> </a:t>
+            </a:r>
+            <a:r>
+              <a:rPr/>
+              <a:t>relacionado</a:t>
+            </a:r>
+          </a:p>
+        </p:txBody>
+      </p:sp>
+      <p:sp>
+        <p:nvSpPr>
+          <p:cNvPr id="3" name="Content Placeholder 2"/>
+          <p:cNvSpPr>
+            <a:spLocks noGrp="1"/>
+          </p:cNvSpPr>
+          <p:nvPr>
+            <p:ph idx="1"/>
+          </p:nvPr>
+        </p:nvSpPr>
+        <p:spPr/>
+        <p:txBody>
+          <a:bodyPr/>
+          <a:lstStyle/>
+          <a:p>
+            <a:pPr lvl="1"/>
+            <a:r>
+              <a:rPr/>
+              <a:t>Sara Barros e Guilherme Campos (2010) ‘Unidades ASH para paralelização de modelos acústicos DWM tridimensionais’. 6as Jornadas Portuguesas de Arquitecturas Reconfiguráveis (REC’2010), Aveiro, Fevereiro 2010.</a:t>
+            </a:r>
+          </a:p>
+          <a:p>
+            <a:pPr lvl="1"/>
+            <a:r>
+              <a:rPr/>
+              <a:t>Carlos Romeiro, Guilherme Campos e Arnaldo Oliveira (2011) ‘Design and Simulation of a Rectangular Meshotron Unit Prototype’. Symposium on Application Accelerators in High Performance Computing (SAAHPC’11), Knoxville, Tennessee, 19-21 Julho.</a:t>
+            </a:r>
+          </a:p>
+          <a:p>
+            <a:pPr lvl="1"/>
+            <a:r>
+              <a:rPr/>
+              <a:t>Kris Wouk (2020) ‘Eight Awesome Raspberry Pi Clusters’. IoT Tech Trends.</a:t>
+            </a:r>
+          </a:p>
+        </p:txBody>
+      </p:sp>
+    </p:spTree>
+  </p:cSld>
+</p:sld>
+</file>
+
+<file path=ppt/slides/slide9.xml><?xml version="1.0" encoding="utf-8"?>
 <p:sld xmlns:a="http://schemas.openxmlformats.org/drawingml/2006/main" xmlns:r="http://schemas.openxmlformats.org/officeDocument/2006/relationships" xmlns:p="http://schemas.openxmlformats.org/presentationml/2006/main">
   <p:cSld>
     <p:spTree>
@@ -3981,113 +4276,6 @@
             <a:r>
               <a:rPr/>
               <a:t>Calendário</a:t>
-            </a:r>
-          </a:p>
-        </p:txBody>
-      </p:sp>
-    </p:spTree>
-  </p:cSld>
-</p:sld>
-</file>
-
-<file path=ppt/slides/slide9.xml><?xml version="1.0" encoding="utf-8"?>
-<p:sld xmlns:a="http://schemas.openxmlformats.org/drawingml/2006/main" xmlns:r="http://schemas.openxmlformats.org/officeDocument/2006/relationships" xmlns:p="http://schemas.openxmlformats.org/presentationml/2006/main">
-  <p:cSld>
-    <p:spTree>
-      <p:nvGrpSpPr>
-        <p:cNvPr id="1" name=""/>
-        <p:cNvGrpSpPr/>
-        <p:nvPr/>
-      </p:nvGrpSpPr>
-      <p:grpSpPr>
-        <a:xfrm>
-          <a:off x="0" y="0"/>
-          <a:ext cx="0" cy="0"/>
-          <a:chOff x="0" y="0"/>
-          <a:chExt cx="0" cy="0"/>
-        </a:xfrm>
-      </p:grpSpPr>
-      <p:sp>
-        <p:nvSpPr>
-          <p:cNvPr id="2" name="Title 1"/>
-          <p:cNvSpPr>
-            <a:spLocks noGrp="1"/>
-          </p:cNvSpPr>
-          <p:nvPr>
-            <p:ph type="title"/>
-          </p:nvPr>
-        </p:nvSpPr>
-        <p:spPr/>
-        <p:txBody>
-          <a:bodyPr/>
-          <a:lstStyle/>
-          <a:p>
-            <a:pPr lvl="0" marL="0" indent="0">
-              <a:buNone/>
-            </a:pPr>
-            <a:r>
-              <a:rPr/>
-              <a:t>Plano</a:t>
-            </a:r>
-            <a:r>
-              <a:rPr/>
-              <a:t> </a:t>
-            </a:r>
-            <a:r>
-              <a:rPr/>
-              <a:t>de</a:t>
-            </a:r>
-            <a:r>
-              <a:rPr/>
-              <a:t> </a:t>
-            </a:r>
-            <a:r>
-              <a:rPr/>
-              <a:t>comunicação</a:t>
-            </a:r>
-          </a:p>
-        </p:txBody>
-      </p:sp>
-      <p:sp>
-        <p:nvSpPr>
-          <p:cNvPr id="3" name="Content Placeholder 2"/>
-          <p:cNvSpPr>
-            <a:spLocks noGrp="1"/>
-          </p:cNvSpPr>
-          <p:nvPr>
-            <p:ph idx="1"/>
-          </p:nvPr>
-        </p:nvSpPr>
-        <p:spPr/>
-        <p:txBody>
-          <a:bodyPr/>
-          <a:lstStyle/>
-          <a:p>
-            <a:pPr lvl="1"/>
-            <a:r>
-              <a:rPr/>
-              <a:t>Site https://meshotron2.github.io/comunication/meshotron/</a:t>
-            </a:r>
-          </a:p>
-          <a:p>
-            <a:pPr lvl="1"/>
-            <a:r>
-              <a:rPr/>
-              <a:t>Github</a:t>
-            </a:r>
-          </a:p>
-          <a:p>
-            <a:pPr lvl="1"/>
-            <a:r>
-              <a:rPr/>
-              <a:t>Jira</a:t>
-            </a:r>
-          </a:p>
-          <a:p>
-            <a:pPr lvl="1"/>
-            <a:r>
-              <a:rPr/>
-              <a:t>Discord</a:t>
             </a:r>
           </a:p>
         </p:txBody>

</xml_diff>